<commit_message>
Estructura CI 1ra parte
Se agregan modelos y controladores en CodeIgniter, se agrega el atributo
"nombre" a la entidad "documento" en el modelo de datos, se agregan
atributos a métodos de controladores y se implementa el diagrama de
secuencia del CU iniciar sesión.
</commit_message>
<xml_diff>
--- a/Diseño/modeloEntidadRelacion.pptx
+++ b/Diseño/modeloEntidadRelacion.pptx
@@ -104,6 +104,22 @@
       </a:defRPr>
     </a:lvl9pPr>
   </p:defaultTextStyle>
+  <p:extLst>
+    <p:ext uri="{EFAFB233-063F-42B5-8137-9DF3F51BA10A}">
+      <p15:sldGuideLst xmlns:p15="http://schemas.microsoft.com/office/powerpoint/2012/main">
+        <p15:guide id="1" orient="horz" pos="2268">
+          <p15:clr>
+            <a:srgbClr val="A4A3A4"/>
+          </p15:clr>
+        </p15:guide>
+        <p15:guide id="2" pos="4536">
+          <p15:clr>
+            <a:srgbClr val="A4A3A4"/>
+          </p15:clr>
+        </p15:guide>
+      </p15:sldGuideLst>
+    </p:ext>
+  </p:extLst>
 </p:presentation>
 </file>
 
@@ -145,7 +161,7 @@
           <a:lstStyle/>
           <a:p>
             <a:r>
-              <a:rPr lang="es-ES" smtClean="0"/>
+              <a:rPr lang="es-ES"/>
               <a:t>Haga clic para modificar el estilo de título del patrón</a:t>
             </a:r>
             <a:endParaRPr lang="es-MX"/>
@@ -264,7 +280,7 @@
           </a:lstStyle>
           <a:p>
             <a:r>
-              <a:rPr lang="es-ES" smtClean="0"/>
+              <a:rPr lang="es-ES"/>
               <a:t>Haga clic para modificar el estilo de subtítulo del patrón</a:t>
             </a:r>
             <a:endParaRPr lang="es-MX"/>
@@ -288,7 +304,7 @@
           <a:p>
             <a:fld id="{9338B90E-5938-4EB4-A8A4-D6B8E5152D8F}" type="datetimeFigureOut">
               <a:rPr lang="es-MX" smtClean="0"/>
-              <a:t>13/10/2018</a:t>
+              <a:t>07/11/2018</a:t>
             </a:fld>
             <a:endParaRPr lang="es-MX"/>
           </a:p>
@@ -382,7 +398,7 @@
           <a:lstStyle/>
           <a:p>
             <a:r>
-              <a:rPr lang="es-ES" smtClean="0"/>
+              <a:rPr lang="es-ES"/>
               <a:t>Haga clic para modificar el estilo de título del patrón</a:t>
             </a:r>
             <a:endParaRPr lang="es-MX"/>
@@ -406,35 +422,35 @@
           <a:p>
             <a:pPr lvl="0"/>
             <a:r>
-              <a:rPr lang="es-ES" smtClean="0"/>
+              <a:rPr lang="es-ES"/>
               <a:t>Haga clic para modificar el estilo de texto del patrón</a:t>
             </a:r>
           </a:p>
           <a:p>
             <a:pPr lvl="1"/>
             <a:r>
-              <a:rPr lang="es-ES" smtClean="0"/>
+              <a:rPr lang="es-ES"/>
               <a:t>Segundo nivel</a:t>
             </a:r>
           </a:p>
           <a:p>
             <a:pPr lvl="2"/>
             <a:r>
-              <a:rPr lang="es-ES" smtClean="0"/>
+              <a:rPr lang="es-ES"/>
               <a:t>Tercer nivel</a:t>
             </a:r>
           </a:p>
           <a:p>
             <a:pPr lvl="3"/>
             <a:r>
-              <a:rPr lang="es-ES" smtClean="0"/>
+              <a:rPr lang="es-ES"/>
               <a:t>Cuarto nivel</a:t>
             </a:r>
           </a:p>
           <a:p>
             <a:pPr lvl="4"/>
             <a:r>
-              <a:rPr lang="es-ES" smtClean="0"/>
+              <a:rPr lang="es-ES"/>
               <a:t>Quinto nivel</a:t>
             </a:r>
             <a:endParaRPr lang="es-MX"/>
@@ -458,7 +474,7 @@
           <a:p>
             <a:fld id="{9338B90E-5938-4EB4-A8A4-D6B8E5152D8F}" type="datetimeFigureOut">
               <a:rPr lang="es-MX" smtClean="0"/>
-              <a:t>13/10/2018</a:t>
+              <a:t>07/11/2018</a:t>
             </a:fld>
             <a:endParaRPr lang="es-MX"/>
           </a:p>
@@ -557,7 +573,7 @@
           <a:lstStyle/>
           <a:p>
             <a:r>
-              <a:rPr lang="es-ES" smtClean="0"/>
+              <a:rPr lang="es-ES"/>
               <a:t>Haga clic para modificar el estilo de título del patrón</a:t>
             </a:r>
             <a:endParaRPr lang="es-MX"/>
@@ -586,35 +602,35 @@
           <a:p>
             <a:pPr lvl="0"/>
             <a:r>
-              <a:rPr lang="es-ES" smtClean="0"/>
+              <a:rPr lang="es-ES"/>
               <a:t>Haga clic para modificar el estilo de texto del patrón</a:t>
             </a:r>
           </a:p>
           <a:p>
             <a:pPr lvl="1"/>
             <a:r>
-              <a:rPr lang="es-ES" smtClean="0"/>
+              <a:rPr lang="es-ES"/>
               <a:t>Segundo nivel</a:t>
             </a:r>
           </a:p>
           <a:p>
             <a:pPr lvl="2"/>
             <a:r>
-              <a:rPr lang="es-ES" smtClean="0"/>
+              <a:rPr lang="es-ES"/>
               <a:t>Tercer nivel</a:t>
             </a:r>
           </a:p>
           <a:p>
             <a:pPr lvl="3"/>
             <a:r>
-              <a:rPr lang="es-ES" smtClean="0"/>
+              <a:rPr lang="es-ES"/>
               <a:t>Cuarto nivel</a:t>
             </a:r>
           </a:p>
           <a:p>
             <a:pPr lvl="4"/>
             <a:r>
-              <a:rPr lang="es-ES" smtClean="0"/>
+              <a:rPr lang="es-ES"/>
               <a:t>Quinto nivel</a:t>
             </a:r>
             <a:endParaRPr lang="es-MX"/>
@@ -638,7 +654,7 @@
           <a:p>
             <a:fld id="{9338B90E-5938-4EB4-A8A4-D6B8E5152D8F}" type="datetimeFigureOut">
               <a:rPr lang="es-MX" smtClean="0"/>
-              <a:t>13/10/2018</a:t>
+              <a:t>07/11/2018</a:t>
             </a:fld>
             <a:endParaRPr lang="es-MX"/>
           </a:p>
@@ -732,7 +748,7 @@
           <a:lstStyle/>
           <a:p>
             <a:r>
-              <a:rPr lang="es-ES" smtClean="0"/>
+              <a:rPr lang="es-ES"/>
               <a:t>Haga clic para modificar el estilo de título del patrón</a:t>
             </a:r>
             <a:endParaRPr lang="es-MX"/>
@@ -756,35 +772,35 @@
           <a:p>
             <a:pPr lvl="0"/>
             <a:r>
-              <a:rPr lang="es-ES" smtClean="0"/>
+              <a:rPr lang="es-ES"/>
               <a:t>Haga clic para modificar el estilo de texto del patrón</a:t>
             </a:r>
           </a:p>
           <a:p>
             <a:pPr lvl="1"/>
             <a:r>
-              <a:rPr lang="es-ES" smtClean="0"/>
+              <a:rPr lang="es-ES"/>
               <a:t>Segundo nivel</a:t>
             </a:r>
           </a:p>
           <a:p>
             <a:pPr lvl="2"/>
             <a:r>
-              <a:rPr lang="es-ES" smtClean="0"/>
+              <a:rPr lang="es-ES"/>
               <a:t>Tercer nivel</a:t>
             </a:r>
           </a:p>
           <a:p>
             <a:pPr lvl="3"/>
             <a:r>
-              <a:rPr lang="es-ES" smtClean="0"/>
+              <a:rPr lang="es-ES"/>
               <a:t>Cuarto nivel</a:t>
             </a:r>
           </a:p>
           <a:p>
             <a:pPr lvl="4"/>
             <a:r>
-              <a:rPr lang="es-ES" smtClean="0"/>
+              <a:rPr lang="es-ES"/>
               <a:t>Quinto nivel</a:t>
             </a:r>
             <a:endParaRPr lang="es-MX"/>
@@ -808,7 +824,7 @@
           <a:p>
             <a:fld id="{9338B90E-5938-4EB4-A8A4-D6B8E5152D8F}" type="datetimeFigureOut">
               <a:rPr lang="es-MX" smtClean="0"/>
-              <a:t>13/10/2018</a:t>
+              <a:t>07/11/2018</a:t>
             </a:fld>
             <a:endParaRPr lang="es-MX"/>
           </a:p>
@@ -911,7 +927,7 @@
           </a:lstStyle>
           <a:p>
             <a:r>
-              <a:rPr lang="es-ES" smtClean="0"/>
+              <a:rPr lang="es-ES"/>
               <a:t>Haga clic para modificar el estilo de título del patrón</a:t>
             </a:r>
             <a:endParaRPr lang="es-MX"/>
@@ -1031,7 +1047,7 @@
           <a:p>
             <a:pPr lvl="0"/>
             <a:r>
-              <a:rPr lang="es-ES" smtClean="0"/>
+              <a:rPr lang="es-ES"/>
               <a:t>Haga clic para modificar el estilo de texto del patrón</a:t>
             </a:r>
           </a:p>
@@ -1054,7 +1070,7 @@
           <a:p>
             <a:fld id="{9338B90E-5938-4EB4-A8A4-D6B8E5152D8F}" type="datetimeFigureOut">
               <a:rPr lang="es-MX" smtClean="0"/>
-              <a:t>13/10/2018</a:t>
+              <a:t>07/11/2018</a:t>
             </a:fld>
             <a:endParaRPr lang="es-MX"/>
           </a:p>
@@ -1148,7 +1164,7 @@
           <a:lstStyle/>
           <a:p>
             <a:r>
-              <a:rPr lang="es-ES" smtClean="0"/>
+              <a:rPr lang="es-ES"/>
               <a:t>Haga clic para modificar el estilo de título del patrón</a:t>
             </a:r>
             <a:endParaRPr lang="es-MX"/>
@@ -1205,35 +1221,35 @@
           <a:p>
             <a:pPr lvl="0"/>
             <a:r>
-              <a:rPr lang="es-ES" smtClean="0"/>
+              <a:rPr lang="es-ES"/>
               <a:t>Haga clic para modificar el estilo de texto del patrón</a:t>
             </a:r>
           </a:p>
           <a:p>
             <a:pPr lvl="1"/>
             <a:r>
-              <a:rPr lang="es-ES" smtClean="0"/>
+              <a:rPr lang="es-ES"/>
               <a:t>Segundo nivel</a:t>
             </a:r>
           </a:p>
           <a:p>
             <a:pPr lvl="2"/>
             <a:r>
-              <a:rPr lang="es-ES" smtClean="0"/>
+              <a:rPr lang="es-ES"/>
               <a:t>Tercer nivel</a:t>
             </a:r>
           </a:p>
           <a:p>
             <a:pPr lvl="3"/>
             <a:r>
-              <a:rPr lang="es-ES" smtClean="0"/>
+              <a:rPr lang="es-ES"/>
               <a:t>Cuarto nivel</a:t>
             </a:r>
           </a:p>
           <a:p>
             <a:pPr lvl="4"/>
             <a:r>
-              <a:rPr lang="es-ES" smtClean="0"/>
+              <a:rPr lang="es-ES"/>
               <a:t>Quinto nivel</a:t>
             </a:r>
             <a:endParaRPr lang="es-MX"/>
@@ -1290,35 +1306,35 @@
           <a:p>
             <a:pPr lvl="0"/>
             <a:r>
-              <a:rPr lang="es-ES" smtClean="0"/>
+              <a:rPr lang="es-ES"/>
               <a:t>Haga clic para modificar el estilo de texto del patrón</a:t>
             </a:r>
           </a:p>
           <a:p>
             <a:pPr lvl="1"/>
             <a:r>
-              <a:rPr lang="es-ES" smtClean="0"/>
+              <a:rPr lang="es-ES"/>
               <a:t>Segundo nivel</a:t>
             </a:r>
           </a:p>
           <a:p>
             <a:pPr lvl="2"/>
             <a:r>
-              <a:rPr lang="es-ES" smtClean="0"/>
+              <a:rPr lang="es-ES"/>
               <a:t>Tercer nivel</a:t>
             </a:r>
           </a:p>
           <a:p>
             <a:pPr lvl="3"/>
             <a:r>
-              <a:rPr lang="es-ES" smtClean="0"/>
+              <a:rPr lang="es-ES"/>
               <a:t>Cuarto nivel</a:t>
             </a:r>
           </a:p>
           <a:p>
             <a:pPr lvl="4"/>
             <a:r>
-              <a:rPr lang="es-ES" smtClean="0"/>
+              <a:rPr lang="es-ES"/>
               <a:t>Quinto nivel</a:t>
             </a:r>
             <a:endParaRPr lang="es-MX"/>
@@ -1342,7 +1358,7 @@
           <a:p>
             <a:fld id="{9338B90E-5938-4EB4-A8A4-D6B8E5152D8F}" type="datetimeFigureOut">
               <a:rPr lang="es-MX" smtClean="0"/>
-              <a:t>13/10/2018</a:t>
+              <a:t>07/11/2018</a:t>
             </a:fld>
             <a:endParaRPr lang="es-MX"/>
           </a:p>
@@ -1445,7 +1461,7 @@
           </a:lstStyle>
           <a:p>
             <a:r>
-              <a:rPr lang="es-ES" smtClean="0"/>
+              <a:rPr lang="es-ES"/>
               <a:t>Haga clic para modificar el estilo de título del patrón</a:t>
             </a:r>
             <a:endParaRPr lang="es-MX"/>
@@ -1511,7 +1527,7 @@
           <a:p>
             <a:pPr lvl="0"/>
             <a:r>
-              <a:rPr lang="es-ES" smtClean="0"/>
+              <a:rPr lang="es-ES"/>
               <a:t>Haga clic para modificar el estilo de texto del patrón</a:t>
             </a:r>
           </a:p>
@@ -1567,35 +1583,35 @@
           <a:p>
             <a:pPr lvl="0"/>
             <a:r>
-              <a:rPr lang="es-ES" smtClean="0"/>
+              <a:rPr lang="es-ES"/>
               <a:t>Haga clic para modificar el estilo de texto del patrón</a:t>
             </a:r>
           </a:p>
           <a:p>
             <a:pPr lvl="1"/>
             <a:r>
-              <a:rPr lang="es-ES" smtClean="0"/>
+              <a:rPr lang="es-ES"/>
               <a:t>Segundo nivel</a:t>
             </a:r>
           </a:p>
           <a:p>
             <a:pPr lvl="2"/>
             <a:r>
-              <a:rPr lang="es-ES" smtClean="0"/>
+              <a:rPr lang="es-ES"/>
               <a:t>Tercer nivel</a:t>
             </a:r>
           </a:p>
           <a:p>
             <a:pPr lvl="3"/>
             <a:r>
-              <a:rPr lang="es-ES" smtClean="0"/>
+              <a:rPr lang="es-ES"/>
               <a:t>Cuarto nivel</a:t>
             </a:r>
           </a:p>
           <a:p>
             <a:pPr lvl="4"/>
             <a:r>
-              <a:rPr lang="es-ES" smtClean="0"/>
+              <a:rPr lang="es-ES"/>
               <a:t>Quinto nivel</a:t>
             </a:r>
             <a:endParaRPr lang="es-MX"/>
@@ -1661,7 +1677,7 @@
           <a:p>
             <a:pPr lvl="0"/>
             <a:r>
-              <a:rPr lang="es-ES" smtClean="0"/>
+              <a:rPr lang="es-ES"/>
               <a:t>Haga clic para modificar el estilo de texto del patrón</a:t>
             </a:r>
           </a:p>
@@ -1717,35 +1733,35 @@
           <a:p>
             <a:pPr lvl="0"/>
             <a:r>
-              <a:rPr lang="es-ES" smtClean="0"/>
+              <a:rPr lang="es-ES"/>
               <a:t>Haga clic para modificar el estilo de texto del patrón</a:t>
             </a:r>
           </a:p>
           <a:p>
             <a:pPr lvl="1"/>
             <a:r>
-              <a:rPr lang="es-ES" smtClean="0"/>
+              <a:rPr lang="es-ES"/>
               <a:t>Segundo nivel</a:t>
             </a:r>
           </a:p>
           <a:p>
             <a:pPr lvl="2"/>
             <a:r>
-              <a:rPr lang="es-ES" smtClean="0"/>
+              <a:rPr lang="es-ES"/>
               <a:t>Tercer nivel</a:t>
             </a:r>
           </a:p>
           <a:p>
             <a:pPr lvl="3"/>
             <a:r>
-              <a:rPr lang="es-ES" smtClean="0"/>
+              <a:rPr lang="es-ES"/>
               <a:t>Cuarto nivel</a:t>
             </a:r>
           </a:p>
           <a:p>
             <a:pPr lvl="4"/>
             <a:r>
-              <a:rPr lang="es-ES" smtClean="0"/>
+              <a:rPr lang="es-ES"/>
               <a:t>Quinto nivel</a:t>
             </a:r>
             <a:endParaRPr lang="es-MX"/>
@@ -1769,7 +1785,7 @@
           <a:p>
             <a:fld id="{9338B90E-5938-4EB4-A8A4-D6B8E5152D8F}" type="datetimeFigureOut">
               <a:rPr lang="es-MX" smtClean="0"/>
-              <a:t>13/10/2018</a:t>
+              <a:t>07/11/2018</a:t>
             </a:fld>
             <a:endParaRPr lang="es-MX"/>
           </a:p>
@@ -1863,7 +1879,7 @@
           <a:lstStyle/>
           <a:p>
             <a:r>
-              <a:rPr lang="es-ES" smtClean="0"/>
+              <a:rPr lang="es-ES"/>
               <a:t>Haga clic para modificar el estilo de título del patrón</a:t>
             </a:r>
             <a:endParaRPr lang="es-MX"/>
@@ -1887,7 +1903,7 @@
           <a:p>
             <a:fld id="{9338B90E-5938-4EB4-A8A4-D6B8E5152D8F}" type="datetimeFigureOut">
               <a:rPr lang="es-MX" smtClean="0"/>
-              <a:t>13/10/2018</a:t>
+              <a:t>07/11/2018</a:t>
             </a:fld>
             <a:endParaRPr lang="es-MX"/>
           </a:p>
@@ -1982,7 +1998,7 @@
           <a:p>
             <a:fld id="{9338B90E-5938-4EB4-A8A4-D6B8E5152D8F}" type="datetimeFigureOut">
               <a:rPr lang="es-MX" smtClean="0"/>
-              <a:t>13/10/2018</a:t>
+              <a:t>07/11/2018</a:t>
             </a:fld>
             <a:endParaRPr lang="es-MX"/>
           </a:p>
@@ -2085,7 +2101,7 @@
           </a:lstStyle>
           <a:p>
             <a:r>
-              <a:rPr lang="es-ES" smtClean="0"/>
+              <a:rPr lang="es-ES"/>
               <a:t>Haga clic para modificar el estilo de título del patrón</a:t>
             </a:r>
             <a:endParaRPr lang="es-MX"/>
@@ -2142,35 +2158,35 @@
           <a:p>
             <a:pPr lvl="0"/>
             <a:r>
-              <a:rPr lang="es-ES" smtClean="0"/>
+              <a:rPr lang="es-ES"/>
               <a:t>Haga clic para modificar el estilo de texto del patrón</a:t>
             </a:r>
           </a:p>
           <a:p>
             <a:pPr lvl="1"/>
             <a:r>
-              <a:rPr lang="es-ES" smtClean="0"/>
+              <a:rPr lang="es-ES"/>
               <a:t>Segundo nivel</a:t>
             </a:r>
           </a:p>
           <a:p>
             <a:pPr lvl="2"/>
             <a:r>
-              <a:rPr lang="es-ES" smtClean="0"/>
+              <a:rPr lang="es-ES"/>
               <a:t>Tercer nivel</a:t>
             </a:r>
           </a:p>
           <a:p>
             <a:pPr lvl="3"/>
             <a:r>
-              <a:rPr lang="es-ES" smtClean="0"/>
+              <a:rPr lang="es-ES"/>
               <a:t>Cuarto nivel</a:t>
             </a:r>
           </a:p>
           <a:p>
             <a:pPr lvl="4"/>
             <a:r>
-              <a:rPr lang="es-ES" smtClean="0"/>
+              <a:rPr lang="es-ES"/>
               <a:t>Quinto nivel</a:t>
             </a:r>
             <a:endParaRPr lang="es-MX"/>
@@ -2236,7 +2252,7 @@
           <a:p>
             <a:pPr lvl="0"/>
             <a:r>
-              <a:rPr lang="es-ES" smtClean="0"/>
+              <a:rPr lang="es-ES"/>
               <a:t>Haga clic para modificar el estilo de texto del patrón</a:t>
             </a:r>
           </a:p>
@@ -2259,7 +2275,7 @@
           <a:p>
             <a:fld id="{9338B90E-5938-4EB4-A8A4-D6B8E5152D8F}" type="datetimeFigureOut">
               <a:rPr lang="es-MX" smtClean="0"/>
-              <a:t>13/10/2018</a:t>
+              <a:t>07/11/2018</a:t>
             </a:fld>
             <a:endParaRPr lang="es-MX"/>
           </a:p>
@@ -2362,7 +2378,7 @@
           </a:lstStyle>
           <a:p>
             <a:r>
-              <a:rPr lang="es-ES" smtClean="0"/>
+              <a:rPr lang="es-ES"/>
               <a:t>Haga clic para modificar el estilo de título del patrón</a:t>
             </a:r>
             <a:endParaRPr lang="es-MX"/>
@@ -2489,7 +2505,7 @@
           <a:p>
             <a:pPr lvl="0"/>
             <a:r>
-              <a:rPr lang="es-ES" smtClean="0"/>
+              <a:rPr lang="es-ES"/>
               <a:t>Haga clic para modificar el estilo de texto del patrón</a:t>
             </a:r>
           </a:p>
@@ -2512,7 +2528,7 @@
           <a:p>
             <a:fld id="{9338B90E-5938-4EB4-A8A4-D6B8E5152D8F}" type="datetimeFigureOut">
               <a:rPr lang="es-MX" smtClean="0"/>
-              <a:t>13/10/2018</a:t>
+              <a:t>07/11/2018</a:t>
             </a:fld>
             <a:endParaRPr lang="es-MX"/>
           </a:p>
@@ -2621,7 +2637,7 @@
           <a:lstStyle/>
           <a:p>
             <a:r>
-              <a:rPr lang="es-ES" smtClean="0"/>
+              <a:rPr lang="es-ES"/>
               <a:t>Haga clic para modificar el estilo de título del patrón</a:t>
             </a:r>
             <a:endParaRPr lang="es-MX"/>
@@ -2655,35 +2671,35 @@
           <a:p>
             <a:pPr lvl="0"/>
             <a:r>
-              <a:rPr lang="es-ES" smtClean="0"/>
+              <a:rPr lang="es-ES"/>
               <a:t>Haga clic para modificar el estilo de texto del patrón</a:t>
             </a:r>
           </a:p>
           <a:p>
             <a:pPr lvl="1"/>
             <a:r>
-              <a:rPr lang="es-ES" smtClean="0"/>
+              <a:rPr lang="es-ES"/>
               <a:t>Segundo nivel</a:t>
             </a:r>
           </a:p>
           <a:p>
             <a:pPr lvl="2"/>
             <a:r>
-              <a:rPr lang="es-ES" smtClean="0"/>
+              <a:rPr lang="es-ES"/>
               <a:t>Tercer nivel</a:t>
             </a:r>
           </a:p>
           <a:p>
             <a:pPr lvl="3"/>
             <a:r>
-              <a:rPr lang="es-ES" smtClean="0"/>
+              <a:rPr lang="es-ES"/>
               <a:t>Cuarto nivel</a:t>
             </a:r>
           </a:p>
           <a:p>
             <a:pPr lvl="4"/>
             <a:r>
-              <a:rPr lang="es-ES" smtClean="0"/>
+              <a:rPr lang="es-ES"/>
               <a:t>Quinto nivel</a:t>
             </a:r>
             <a:endParaRPr lang="es-MX"/>
@@ -2725,7 +2741,7 @@
           <a:p>
             <a:fld id="{9338B90E-5938-4EB4-A8A4-D6B8E5152D8F}" type="datetimeFigureOut">
               <a:rPr lang="es-MX" smtClean="0"/>
-              <a:t>13/10/2018</a:t>
+              <a:t>07/11/2018</a:t>
             </a:fld>
             <a:endParaRPr lang="es-MX"/>
           </a:p>
@@ -3135,10 +3151,9 @@
           <a:p>
             <a:pPr algn="ctr"/>
             <a:r>
-              <a:rPr lang="es-MX" dirty="0" smtClean="0"/>
+              <a:rPr lang="es-MX" dirty="0"/>
               <a:t>Académico</a:t>
             </a:r>
-            <a:endParaRPr lang="es-MX" dirty="0"/>
           </a:p>
         </p:txBody>
       </p:sp>
@@ -3179,7 +3194,7 @@
           <a:p>
             <a:pPr algn="ctr"/>
             <a:r>
-              <a:rPr lang="es-MX" u="sng" dirty="0" err="1" smtClean="0"/>
+              <a:rPr lang="es-MX" u="sng" dirty="0" err="1"/>
               <a:t>idAcadémico</a:t>
             </a:r>
             <a:endParaRPr lang="es-MX" u="sng" dirty="0"/>
@@ -3256,10 +3271,9 @@
           <a:p>
             <a:pPr algn="ctr"/>
             <a:r>
-              <a:rPr lang="es-MX" dirty="0" smtClean="0"/>
+              <a:rPr lang="es-MX" dirty="0"/>
               <a:t>nombre</a:t>
             </a:r>
-            <a:endParaRPr lang="es-MX" dirty="0"/>
           </a:p>
         </p:txBody>
       </p:sp>
@@ -3300,10 +3314,10 @@
           <a:p>
             <a:pPr algn="ctr"/>
             <a:r>
-              <a:rPr lang="es-MX" dirty="0" err="1" smtClean="0"/>
+              <a:rPr lang="es-MX" dirty="0" err="1"/>
               <a:t>nombreUsuario</a:t>
             </a:r>
-            <a:endParaRPr lang="es-MX" dirty="0" smtClean="0"/>
+            <a:endParaRPr lang="es-MX" dirty="0"/>
           </a:p>
         </p:txBody>
       </p:sp>
@@ -3344,10 +3358,9 @@
           <a:p>
             <a:pPr algn="ctr"/>
             <a:r>
-              <a:rPr lang="es-MX" dirty="0" smtClean="0"/>
+              <a:rPr lang="es-MX" dirty="0"/>
               <a:t>correo</a:t>
             </a:r>
-            <a:endParaRPr lang="es-MX" dirty="0"/>
           </a:p>
         </p:txBody>
       </p:sp>
@@ -3388,10 +3401,9 @@
           <a:p>
             <a:pPr algn="ctr"/>
             <a:r>
-              <a:rPr lang="es-MX" dirty="0" smtClean="0"/>
+              <a:rPr lang="es-MX" dirty="0"/>
               <a:t>contraseña</a:t>
             </a:r>
-            <a:endParaRPr lang="es-MX" dirty="0"/>
           </a:p>
         </p:txBody>
       </p:sp>
@@ -3562,10 +3574,9 @@
           <a:p>
             <a:pPr algn="ctr"/>
             <a:r>
-              <a:rPr lang="es-MX" dirty="0" smtClean="0"/>
+              <a:rPr lang="es-MX" dirty="0"/>
               <a:t>documento</a:t>
             </a:r>
-            <a:endParaRPr lang="es-MX" dirty="0"/>
           </a:p>
         </p:txBody>
       </p:sp>
@@ -3642,7 +3653,7 @@
           <a:p>
             <a:pPr algn="ctr"/>
             <a:r>
-              <a:rPr lang="es-MX" u="sng" dirty="0" err="1" smtClean="0"/>
+              <a:rPr lang="es-MX" u="sng" dirty="0" err="1"/>
               <a:t>idDocumento</a:t>
             </a:r>
             <a:endParaRPr lang="es-MX" u="sng" dirty="0"/>
@@ -3657,7 +3668,7 @@
         </p:nvSpPr>
         <p:spPr>
           <a:xfrm>
-            <a:off x="11709805" y="4274174"/>
+            <a:off x="10297609" y="4507277"/>
             <a:ext cx="2374013" cy="704147"/>
           </a:xfrm>
           <a:prstGeom prst="ellipse">
@@ -3686,7 +3697,7 @@
           <a:p>
             <a:pPr algn="ctr"/>
             <a:r>
-              <a:rPr lang="es-MX" dirty="0" err="1" smtClean="0"/>
+              <a:rPr lang="es-MX" dirty="0" err="1"/>
               <a:t>fechaRegistro</a:t>
             </a:r>
             <a:endParaRPr lang="es-MX" dirty="0"/>
@@ -3737,8 +3748,8 @@
         </p:nvCxnSpPr>
         <p:spPr>
           <a:xfrm flipH="1">
-            <a:off x="12896812" y="3395627"/>
-            <a:ext cx="88131" cy="878547"/>
+            <a:off x="11484616" y="3395627"/>
+            <a:ext cx="1500327" cy="1111650"/>
           </a:xfrm>
           <a:prstGeom prst="line">
             <a:avLst/>
@@ -3796,7 +3807,7 @@
           <a:p>
             <a:pPr algn="ctr"/>
             <a:r>
-              <a:rPr lang="es-MX" dirty="0" err="1" smtClean="0"/>
+              <a:rPr lang="es-MX" dirty="0" err="1"/>
               <a:t>idAcadémico</a:t>
             </a:r>
             <a:endParaRPr lang="es-MX" dirty="0"/>
@@ -3840,7 +3851,7 @@
           <a:p>
             <a:pPr algn="ctr"/>
             <a:r>
-              <a:rPr lang="es-MX" u="sng" dirty="0" err="1" smtClean="0"/>
+              <a:rPr lang="es-MX" u="sng" dirty="0" err="1"/>
               <a:t>firmaPrivada</a:t>
             </a:r>
             <a:endParaRPr lang="es-MX" u="sng" dirty="0"/>
@@ -3884,7 +3895,7 @@
           <a:p>
             <a:pPr algn="ctr"/>
             <a:r>
-              <a:rPr lang="es-MX" dirty="0" err="1" smtClean="0"/>
+              <a:rPr lang="es-MX" dirty="0" err="1"/>
               <a:t>firmaPublica</a:t>
             </a:r>
             <a:endParaRPr lang="es-MX" dirty="0"/>
@@ -4027,7 +4038,7 @@
           <a:p>
             <a:pPr algn="ctr"/>
             <a:r>
-              <a:rPr lang="es-MX" u="sng" dirty="0" err="1" smtClean="0"/>
+              <a:rPr lang="es-MX" u="sng" dirty="0" err="1"/>
               <a:t>idAcadémico</a:t>
             </a:r>
             <a:endParaRPr lang="es-MX" u="sng" dirty="0"/>
@@ -4102,10 +4113,9 @@
           <a:p>
             <a:pPr algn="ctr"/>
             <a:r>
-              <a:rPr lang="es-MX" dirty="0" smtClean="0"/>
+              <a:rPr lang="es-MX" dirty="0"/>
               <a:t>firma</a:t>
             </a:r>
-            <a:endParaRPr lang="es-MX" dirty="0"/>
           </a:p>
         </p:txBody>
       </p:sp>
@@ -4144,10 +4154,9 @@
           <a:p>
             <a:pPr algn="ctr"/>
             <a:r>
-              <a:rPr lang="es-MX" dirty="0" smtClean="0"/>
+              <a:rPr lang="es-MX" dirty="0"/>
               <a:t>tiene</a:t>
             </a:r>
-            <a:endParaRPr lang="es-MX" dirty="0"/>
           </a:p>
         </p:txBody>
       </p:sp>
@@ -4222,10 +4231,9 @@
           <a:p>
             <a:pPr algn="ctr"/>
             <a:r>
-              <a:rPr lang="es-MX" dirty="0" smtClean="0"/>
+              <a:rPr lang="es-MX" dirty="0"/>
               <a:t>comparte</a:t>
             </a:r>
-            <a:endParaRPr lang="es-MX" dirty="0"/>
           </a:p>
         </p:txBody>
       </p:sp>
@@ -4338,10 +4346,10 @@
           <a:p>
             <a:pPr algn="ctr"/>
             <a:r>
-              <a:rPr lang="es-MX" u="sng" dirty="0" err="1" smtClean="0"/>
+              <a:rPr lang="es-MX" u="sng" dirty="0" err="1"/>
               <a:t>idAcadémicoEmisor</a:t>
             </a:r>
-            <a:endParaRPr lang="es-MX" u="sng" dirty="0" smtClean="0"/>
+            <a:endParaRPr lang="es-MX" u="sng" dirty="0"/>
           </a:p>
         </p:txBody>
       </p:sp>
@@ -4382,7 +4390,7 @@
           <a:p>
             <a:pPr algn="ctr"/>
             <a:r>
-              <a:rPr lang="es-MX" u="sng" dirty="0" err="1" smtClean="0"/>
+              <a:rPr lang="es-MX" u="sng" dirty="0" err="1"/>
               <a:t>idAcadémicoReceptor</a:t>
             </a:r>
             <a:endParaRPr lang="es-MX" u="sng" dirty="0"/>
@@ -4426,7 +4434,7 @@
           <a:p>
             <a:pPr algn="ctr"/>
             <a:r>
-              <a:rPr lang="es-MX" dirty="0" err="1" smtClean="0"/>
+              <a:rPr lang="es-MX" dirty="0" err="1"/>
               <a:t>idDocumento</a:t>
             </a:r>
             <a:endParaRPr lang="es-MX" dirty="0"/>
@@ -4555,10 +4563,9 @@
           <a:lstStyle/>
           <a:p>
             <a:r>
-              <a:rPr lang="es-MX" dirty="0" smtClean="0"/>
+              <a:rPr lang="es-MX" dirty="0"/>
               <a:t>1</a:t>
             </a:r>
-            <a:endParaRPr lang="es-MX" dirty="0"/>
           </a:p>
         </p:txBody>
       </p:sp>
@@ -4585,10 +4592,9 @@
           <a:lstStyle/>
           <a:p>
             <a:r>
-              <a:rPr lang="es-MX" dirty="0" smtClean="0"/>
+              <a:rPr lang="es-MX" dirty="0"/>
               <a:t>1</a:t>
             </a:r>
-            <a:endParaRPr lang="es-MX" dirty="0"/>
           </a:p>
         </p:txBody>
       </p:sp>
@@ -4615,10 +4621,9 @@
           <a:lstStyle/>
           <a:p>
             <a:r>
-              <a:rPr lang="es-MX" dirty="0" smtClean="0"/>
+              <a:rPr lang="es-MX" dirty="0"/>
               <a:t>1..*</a:t>
             </a:r>
-            <a:endParaRPr lang="es-MX" dirty="0"/>
           </a:p>
         </p:txBody>
       </p:sp>
@@ -4645,13 +4650,101 @@
           <a:lstStyle/>
           <a:p>
             <a:r>
-              <a:rPr lang="es-MX" dirty="0" smtClean="0"/>
+              <a:rPr lang="es-MX" dirty="0"/>
               <a:t>1</a:t>
             </a:r>
-            <a:endParaRPr lang="es-MX" dirty="0"/>
-          </a:p>
-        </p:txBody>
-      </p:sp>
+          </a:p>
+        </p:txBody>
+      </p:sp>
+      <p:sp>
+        <p:nvSpPr>
+          <p:cNvPr id="43" name="47 Elipse">
+            <a:extLst>
+              <a:ext uri="{FF2B5EF4-FFF2-40B4-BE49-F238E27FC236}">
+                <a16:creationId xmlns:a16="http://schemas.microsoft.com/office/drawing/2014/main" id="{5248DE7B-1574-484E-9513-E26D79938DC8}"/>
+              </a:ext>
+            </a:extLst>
+          </p:cNvPr>
+          <p:cNvSpPr/>
+          <p:nvPr/>
+        </p:nvSpPr>
+        <p:spPr>
+          <a:xfrm>
+            <a:off x="12704191" y="4048857"/>
+            <a:ext cx="1531383" cy="704147"/>
+          </a:xfrm>
+          <a:prstGeom prst="ellipse">
+            <a:avLst/>
+          </a:prstGeom>
+        </p:spPr>
+        <p:style>
+          <a:lnRef idx="2">
+            <a:schemeClr val="accent5">
+              <a:shade val="50000"/>
+            </a:schemeClr>
+          </a:lnRef>
+          <a:fillRef idx="1">
+            <a:schemeClr val="accent5"/>
+          </a:fillRef>
+          <a:effectRef idx="0">
+            <a:schemeClr val="accent5"/>
+          </a:effectRef>
+          <a:fontRef idx="minor">
+            <a:schemeClr val="lt1"/>
+          </a:fontRef>
+        </p:style>
+        <p:txBody>
+          <a:bodyPr lIns="102870" tIns="51435" rIns="102870" bIns="51435" spcCol="0" rtlCol="0" anchor="ctr"/>
+          <a:lstStyle/>
+          <a:p>
+            <a:pPr algn="ctr"/>
+            <a:r>
+              <a:rPr lang="es-MX" dirty="0"/>
+              <a:t>nombre</a:t>
+            </a:r>
+          </a:p>
+        </p:txBody>
+      </p:sp>
+      <p:cxnSp>
+        <p:nvCxnSpPr>
+          <p:cNvPr id="45" name="54 Conector recto">
+            <a:extLst>
+              <a:ext uri="{FF2B5EF4-FFF2-40B4-BE49-F238E27FC236}">
+                <a16:creationId xmlns:a16="http://schemas.microsoft.com/office/drawing/2014/main" id="{F9414C0D-EF55-4C04-A06A-DDEC56179616}"/>
+              </a:ext>
+            </a:extLst>
+          </p:cNvPr>
+          <p:cNvCxnSpPr>
+            <a:cxnSpLocks/>
+            <a:stCxn id="29" idx="2"/>
+            <a:endCxn id="43" idx="0"/>
+          </p:cNvCxnSpPr>
+          <p:nvPr/>
+        </p:nvCxnSpPr>
+        <p:spPr>
+          <a:xfrm>
+            <a:off x="12984943" y="3395627"/>
+            <a:ext cx="484940" cy="653230"/>
+          </a:xfrm>
+          <a:prstGeom prst="line">
+            <a:avLst/>
+          </a:prstGeom>
+        </p:spPr>
+        <p:style>
+          <a:lnRef idx="1">
+            <a:schemeClr val="accent1"/>
+          </a:lnRef>
+          <a:fillRef idx="0">
+            <a:schemeClr val="accent1"/>
+          </a:fillRef>
+          <a:effectRef idx="0">
+            <a:schemeClr val="accent1"/>
+          </a:effectRef>
+          <a:fontRef idx="minor">
+            <a:schemeClr val="tx1"/>
+          </a:fontRef>
+        </p:style>
+      </p:cxnSp>
     </p:spTree>
     <p:extLst>
       <p:ext uri="{BB962C8B-B14F-4D97-AF65-F5344CB8AC3E}">

</xml_diff>